<commit_message>
Assignment 03 SPSS output
</commit_message>
<xml_diff>
--- a/Assignments/Assignment03/Docs/Townes_SOC6100_Assignment03_PathModel_Diagram_v00.pptx
+++ b/Assignments/Assignment03/Docs/Townes_SOC6100_Assignment03_PathModel_Diagram_v00.pptx
@@ -6,6 +6,7 @@
   </p:sldMasterIdLst>
   <p:sldIdLst>
     <p:sldId id="256" r:id="rId2"/>
+    <p:sldId id="257" r:id="rId3"/>
   </p:sldIdLst>
   <p:sldSz cx="9144000" cy="5715000" type="screen16x10"/>
   <p:notesSz cx="7010400" cy="9296400"/>
@@ -288,7 +289,7 @@
           <a:p>
             <a:fld id="{BF30DF70-5848-4672-8949-A08F2F452BE1}" type="datetimeFigureOut">
               <a:rPr lang="en-US" smtClean="0"/>
-              <a:t>10/17/2018</a:t>
+              <a:t>10/23/2018</a:t>
             </a:fld>
             <a:endParaRPr lang="en-US"/>
           </a:p>
@@ -458,7 +459,7 @@
           <a:p>
             <a:fld id="{BF30DF70-5848-4672-8949-A08F2F452BE1}" type="datetimeFigureOut">
               <a:rPr lang="en-US" smtClean="0"/>
-              <a:t>10/17/2018</a:t>
+              <a:t>10/23/2018</a:t>
             </a:fld>
             <a:endParaRPr lang="en-US"/>
           </a:p>
@@ -638,7 +639,7 @@
           <a:p>
             <a:fld id="{BF30DF70-5848-4672-8949-A08F2F452BE1}" type="datetimeFigureOut">
               <a:rPr lang="en-US" smtClean="0"/>
-              <a:t>10/17/2018</a:t>
+              <a:t>10/23/2018</a:t>
             </a:fld>
             <a:endParaRPr lang="en-US"/>
           </a:p>
@@ -808,7 +809,7 @@
           <a:p>
             <a:fld id="{BF30DF70-5848-4672-8949-A08F2F452BE1}" type="datetimeFigureOut">
               <a:rPr lang="en-US" smtClean="0"/>
-              <a:t>10/17/2018</a:t>
+              <a:t>10/23/2018</a:t>
             </a:fld>
             <a:endParaRPr lang="en-US"/>
           </a:p>
@@ -1054,7 +1055,7 @@
           <a:p>
             <a:fld id="{BF30DF70-5848-4672-8949-A08F2F452BE1}" type="datetimeFigureOut">
               <a:rPr lang="en-US" smtClean="0"/>
-              <a:t>10/17/2018</a:t>
+              <a:t>10/23/2018</a:t>
             </a:fld>
             <a:endParaRPr lang="en-US"/>
           </a:p>
@@ -1342,7 +1343,7 @@
           <a:p>
             <a:fld id="{BF30DF70-5848-4672-8949-A08F2F452BE1}" type="datetimeFigureOut">
               <a:rPr lang="en-US" smtClean="0"/>
-              <a:t>10/17/2018</a:t>
+              <a:t>10/23/2018</a:t>
             </a:fld>
             <a:endParaRPr lang="en-US"/>
           </a:p>
@@ -1769,7 +1770,7 @@
           <a:p>
             <a:fld id="{BF30DF70-5848-4672-8949-A08F2F452BE1}" type="datetimeFigureOut">
               <a:rPr lang="en-US" smtClean="0"/>
-              <a:t>10/17/2018</a:t>
+              <a:t>10/23/2018</a:t>
             </a:fld>
             <a:endParaRPr lang="en-US"/>
           </a:p>
@@ -1887,7 +1888,7 @@
           <a:p>
             <a:fld id="{BF30DF70-5848-4672-8949-A08F2F452BE1}" type="datetimeFigureOut">
               <a:rPr lang="en-US" smtClean="0"/>
-              <a:t>10/17/2018</a:t>
+              <a:t>10/23/2018</a:t>
             </a:fld>
             <a:endParaRPr lang="en-US"/>
           </a:p>
@@ -1982,7 +1983,7 @@
           <a:p>
             <a:fld id="{BF30DF70-5848-4672-8949-A08F2F452BE1}" type="datetimeFigureOut">
               <a:rPr lang="en-US" smtClean="0"/>
-              <a:t>10/17/2018</a:t>
+              <a:t>10/23/2018</a:t>
             </a:fld>
             <a:endParaRPr lang="en-US"/>
           </a:p>
@@ -2259,7 +2260,7 @@
           <a:p>
             <a:fld id="{BF30DF70-5848-4672-8949-A08F2F452BE1}" type="datetimeFigureOut">
               <a:rPr lang="en-US" smtClean="0"/>
-              <a:t>10/17/2018</a:t>
+              <a:t>10/23/2018</a:t>
             </a:fld>
             <a:endParaRPr lang="en-US"/>
           </a:p>
@@ -2512,7 +2513,7 @@
           <a:p>
             <a:fld id="{BF30DF70-5848-4672-8949-A08F2F452BE1}" type="datetimeFigureOut">
               <a:rPr lang="en-US" smtClean="0"/>
-              <a:t>10/17/2018</a:t>
+              <a:t>10/23/2018</a:t>
             </a:fld>
             <a:endParaRPr lang="en-US"/>
           </a:p>
@@ -2725,7 +2726,7 @@
           <a:p>
             <a:fld id="{BF30DF70-5848-4672-8949-A08F2F452BE1}" type="datetimeFigureOut">
               <a:rPr lang="en-US" smtClean="0"/>
-              <a:t>10/17/2018</a:t>
+              <a:t>10/23/2018</a:t>
             </a:fld>
             <a:endParaRPr lang="en-US"/>
           </a:p>
@@ -3108,7 +3109,7 @@
         </p:nvSpPr>
         <p:spPr>
           <a:xfrm>
-            <a:off x="7696200" y="2628900"/>
+            <a:off x="6781800" y="2628900"/>
             <a:ext cx="1371600" cy="457200"/>
           </a:xfrm>
           <a:prstGeom prst="roundRect">
@@ -3137,8 +3138,8 @@
           <a:p>
             <a:pPr algn="ctr"/>
             <a:r>
-              <a:rPr lang="en-US" dirty="0" smtClean="0"/>
-              <a:t>CRECEIVE</a:t>
+              <a:rPr lang="en-US" dirty="0" err="1" smtClean="0"/>
+              <a:t>CRECEIVEtr</a:t>
             </a:r>
             <a:endParaRPr lang="en-US" dirty="0"/>
           </a:p>
@@ -3152,7 +3153,7 @@
         </p:nvSpPr>
         <p:spPr>
           <a:xfrm>
-            <a:off x="2743200" y="2628900"/>
+            <a:off x="4343400" y="2628900"/>
             <a:ext cx="1371600" cy="457200"/>
           </a:xfrm>
           <a:prstGeom prst="roundRect">
@@ -3196,7 +3197,7 @@
         </p:nvSpPr>
         <p:spPr>
           <a:xfrm>
-            <a:off x="152400" y="3924300"/>
+            <a:off x="1143000" y="4533900"/>
             <a:ext cx="1371600" cy="457200"/>
           </a:xfrm>
           <a:prstGeom prst="roundRect">
@@ -3240,7 +3241,7 @@
         </p:nvSpPr>
         <p:spPr>
           <a:xfrm>
-            <a:off x="152400" y="1333500"/>
+            <a:off x="1143000" y="800100"/>
             <a:ext cx="1371600" cy="457200"/>
           </a:xfrm>
           <a:prstGeom prst="roundRect">
@@ -3284,7 +3285,7 @@
         </p:nvSpPr>
         <p:spPr>
           <a:xfrm>
-            <a:off x="5257800" y="1943100"/>
+            <a:off x="4343400" y="1638300"/>
             <a:ext cx="1371600" cy="457200"/>
           </a:xfrm>
           <a:prstGeom prst="roundRect">
@@ -3328,7 +3329,7 @@
         </p:nvSpPr>
         <p:spPr>
           <a:xfrm>
-            <a:off x="5257800" y="3390900"/>
+            <a:off x="4343400" y="3695700"/>
             <a:ext cx="1371600" cy="457200"/>
           </a:xfrm>
           <a:prstGeom prst="roundRect">
@@ -3375,164 +3376,8 @@
         </p:nvCxnSpPr>
         <p:spPr>
           <a:xfrm>
-            <a:off x="4114800" y="2857500"/>
-            <a:ext cx="3581400" cy="0"/>
-          </a:xfrm>
-          <a:prstGeom prst="straightConnector1">
-            <a:avLst/>
-          </a:prstGeom>
-          <a:ln w="25400">
-            <a:solidFill>
-              <a:schemeClr val="tx1"/>
-            </a:solidFill>
-            <a:tailEnd type="triangle" w="lg" len="lg"/>
-          </a:ln>
-        </p:spPr>
-        <p:style>
-          <a:lnRef idx="1">
-            <a:schemeClr val="accent1"/>
-          </a:lnRef>
-          <a:fillRef idx="0">
-            <a:schemeClr val="accent1"/>
-          </a:fillRef>
-          <a:effectRef idx="0">
-            <a:schemeClr val="accent1"/>
-          </a:effectRef>
-          <a:fontRef idx="minor">
-            <a:schemeClr val="tx1"/>
-          </a:fontRef>
-        </p:style>
-      </p:cxnSp>
-      <p:cxnSp>
-        <p:nvCxnSpPr>
-          <p:cNvPr id="13" name="Straight Arrow Connector 12"/>
-          <p:cNvCxnSpPr>
-            <a:stCxn id="7" idx="3"/>
-            <a:endCxn id="5" idx="1"/>
-          </p:cNvCxnSpPr>
-          <p:nvPr/>
-        </p:nvCxnSpPr>
-        <p:spPr>
-          <a:xfrm>
-            <a:off x="1524000" y="1562100"/>
-            <a:ext cx="1219200" cy="1295400"/>
-          </a:xfrm>
-          <a:prstGeom prst="straightConnector1">
-            <a:avLst/>
-          </a:prstGeom>
-          <a:ln w="25400">
-            <a:solidFill>
-              <a:schemeClr val="tx1"/>
-            </a:solidFill>
-            <a:tailEnd type="triangle" w="lg" len="lg"/>
-          </a:ln>
-        </p:spPr>
-        <p:style>
-          <a:lnRef idx="1">
-            <a:schemeClr val="accent1"/>
-          </a:lnRef>
-          <a:fillRef idx="0">
-            <a:schemeClr val="accent1"/>
-          </a:fillRef>
-          <a:effectRef idx="0">
-            <a:schemeClr val="accent1"/>
-          </a:effectRef>
-          <a:fontRef idx="minor">
-            <a:schemeClr val="tx1"/>
-          </a:fontRef>
-        </p:style>
-      </p:cxnSp>
-      <p:cxnSp>
-        <p:nvCxnSpPr>
-          <p:cNvPr id="15" name="Straight Arrow Connector 14"/>
-          <p:cNvCxnSpPr>
-            <a:stCxn id="6" idx="3"/>
-            <a:endCxn id="5" idx="1"/>
-          </p:cNvCxnSpPr>
-          <p:nvPr/>
-        </p:nvCxnSpPr>
-        <p:spPr>
-          <a:xfrm flipV="1">
-            <a:off x="1524000" y="2857500"/>
-            <a:ext cx="1219200" cy="1295400"/>
-          </a:xfrm>
-          <a:prstGeom prst="straightConnector1">
-            <a:avLst/>
-          </a:prstGeom>
-          <a:ln w="25400">
-            <a:solidFill>
-              <a:schemeClr val="tx1"/>
-            </a:solidFill>
-            <a:tailEnd type="triangle" w="lg" len="lg"/>
-          </a:ln>
-        </p:spPr>
-        <p:style>
-          <a:lnRef idx="1">
-            <a:schemeClr val="accent1"/>
-          </a:lnRef>
-          <a:fillRef idx="0">
-            <a:schemeClr val="accent1"/>
-          </a:fillRef>
-          <a:effectRef idx="0">
-            <a:schemeClr val="accent1"/>
-          </a:effectRef>
-          <a:fontRef idx="minor">
-            <a:schemeClr val="tx1"/>
-          </a:fontRef>
-        </p:style>
-      </p:cxnSp>
-      <p:cxnSp>
-        <p:nvCxnSpPr>
-          <p:cNvPr id="17" name="Straight Arrow Connector 16"/>
-          <p:cNvCxnSpPr>
-            <a:stCxn id="5" idx="3"/>
-            <a:endCxn id="8" idx="1"/>
-          </p:cNvCxnSpPr>
-          <p:nvPr/>
-        </p:nvCxnSpPr>
-        <p:spPr>
-          <a:xfrm flipV="1">
-            <a:off x="4114800" y="2171700"/>
-            <a:ext cx="1143000" cy="685800"/>
-          </a:xfrm>
-          <a:prstGeom prst="straightConnector1">
-            <a:avLst/>
-          </a:prstGeom>
-          <a:ln w="25400">
-            <a:solidFill>
-              <a:schemeClr val="tx1"/>
-            </a:solidFill>
-            <a:tailEnd type="triangle" w="lg" len="lg"/>
-          </a:ln>
-        </p:spPr>
-        <p:style>
-          <a:lnRef idx="1">
-            <a:schemeClr val="accent1"/>
-          </a:lnRef>
-          <a:fillRef idx="0">
-            <a:schemeClr val="accent1"/>
-          </a:fillRef>
-          <a:effectRef idx="0">
-            <a:schemeClr val="accent1"/>
-          </a:effectRef>
-          <a:fontRef idx="minor">
-            <a:schemeClr val="tx1"/>
-          </a:fontRef>
-        </p:style>
-      </p:cxnSp>
-      <p:cxnSp>
-        <p:nvCxnSpPr>
-          <p:cNvPr id="19" name="Straight Arrow Connector 18"/>
-          <p:cNvCxnSpPr>
-            <a:stCxn id="5" idx="3"/>
-            <a:endCxn id="9" idx="1"/>
-          </p:cNvCxnSpPr>
-          <p:nvPr/>
-        </p:nvCxnSpPr>
-        <p:spPr>
-          <a:xfrm>
-            <a:off x="4114800" y="2857500"/>
-            <a:ext cx="1143000" cy="762000"/>
+            <a:off x="5715000" y="2857500"/>
+            <a:ext cx="1066800" cy="0"/>
           </a:xfrm>
           <a:prstGeom prst="straightConnector1">
             <a:avLst/>
@@ -3570,8 +3415,8 @@
         </p:nvCxnSpPr>
         <p:spPr>
           <a:xfrm flipV="1">
-            <a:off x="6629400" y="2857500"/>
-            <a:ext cx="1066800" cy="762000"/>
+            <a:off x="5715000" y="2857500"/>
+            <a:ext cx="1066800" cy="1066800"/>
           </a:xfrm>
           <a:prstGeom prst="straightConnector1">
             <a:avLst/>
@@ -3609,8 +3454,8 @@
         </p:nvCxnSpPr>
         <p:spPr>
           <a:xfrm>
-            <a:off x="6629400" y="2171700"/>
-            <a:ext cx="1066800" cy="685800"/>
+            <a:off x="5715000" y="1866900"/>
+            <a:ext cx="1066800" cy="990600"/>
           </a:xfrm>
           <a:prstGeom prst="straightConnector1">
             <a:avLst/>
@@ -3648,8 +3493,8 @@
         </p:nvCxnSpPr>
         <p:spPr>
           <a:xfrm>
-            <a:off x="1524000" y="1562100"/>
-            <a:ext cx="6858000" cy="1066800"/>
+            <a:off x="2514600" y="1028700"/>
+            <a:ext cx="4953000" cy="1600200"/>
           </a:xfrm>
           <a:prstGeom prst="bentConnector2">
             <a:avLst/>
@@ -3687,8 +3532,8 @@
         </p:nvCxnSpPr>
         <p:spPr>
           <a:xfrm flipV="1">
-            <a:off x="1524000" y="3086100"/>
-            <a:ext cx="6858000" cy="1066800"/>
+            <a:off x="2514600" y="3086100"/>
+            <a:ext cx="4953000" cy="1676400"/>
           </a:xfrm>
           <a:prstGeom prst="bentConnector2">
             <a:avLst/>
@@ -3726,8 +3571,164 @@
         </p:nvCxnSpPr>
         <p:spPr>
           <a:xfrm flipV="1">
-            <a:off x="838200" y="1790700"/>
-            <a:ext cx="0" cy="2133600"/>
+            <a:off x="1828800" y="1257300"/>
+            <a:ext cx="0" cy="3276600"/>
+          </a:xfrm>
+          <a:prstGeom prst="straightConnector1">
+            <a:avLst/>
+          </a:prstGeom>
+          <a:ln w="25400">
+            <a:solidFill>
+              <a:schemeClr val="tx1"/>
+            </a:solidFill>
+            <a:tailEnd type="triangle" w="lg" len="lg"/>
+          </a:ln>
+        </p:spPr>
+        <p:style>
+          <a:lnRef idx="1">
+            <a:schemeClr val="accent1"/>
+          </a:lnRef>
+          <a:fillRef idx="0">
+            <a:schemeClr val="accent1"/>
+          </a:fillRef>
+          <a:effectRef idx="0">
+            <a:schemeClr val="accent1"/>
+          </a:effectRef>
+          <a:fontRef idx="minor">
+            <a:schemeClr val="tx1"/>
+          </a:fontRef>
+        </p:style>
+      </p:cxnSp>
+      <p:cxnSp>
+        <p:nvCxnSpPr>
+          <p:cNvPr id="22" name="Straight Arrow Connector 21"/>
+          <p:cNvCxnSpPr>
+            <a:stCxn id="7" idx="3"/>
+            <a:endCxn id="5" idx="1"/>
+          </p:cNvCxnSpPr>
+          <p:nvPr/>
+        </p:nvCxnSpPr>
+        <p:spPr>
+          <a:xfrm>
+            <a:off x="2514600" y="1028700"/>
+            <a:ext cx="1828800" cy="1828800"/>
+          </a:xfrm>
+          <a:prstGeom prst="straightConnector1">
+            <a:avLst/>
+          </a:prstGeom>
+          <a:ln w="25400">
+            <a:solidFill>
+              <a:schemeClr val="tx1"/>
+            </a:solidFill>
+            <a:tailEnd type="triangle" w="lg" len="lg"/>
+          </a:ln>
+        </p:spPr>
+        <p:style>
+          <a:lnRef idx="1">
+            <a:schemeClr val="accent1"/>
+          </a:lnRef>
+          <a:fillRef idx="0">
+            <a:schemeClr val="accent1"/>
+          </a:fillRef>
+          <a:effectRef idx="0">
+            <a:schemeClr val="accent1"/>
+          </a:effectRef>
+          <a:fontRef idx="minor">
+            <a:schemeClr val="tx1"/>
+          </a:fontRef>
+        </p:style>
+      </p:cxnSp>
+      <p:cxnSp>
+        <p:nvCxnSpPr>
+          <p:cNvPr id="26" name="Straight Arrow Connector 25"/>
+          <p:cNvCxnSpPr>
+            <a:stCxn id="6" idx="3"/>
+            <a:endCxn id="5" idx="1"/>
+          </p:cNvCxnSpPr>
+          <p:nvPr/>
+        </p:nvCxnSpPr>
+        <p:spPr>
+          <a:xfrm flipV="1">
+            <a:off x="2514600" y="2857500"/>
+            <a:ext cx="1828800" cy="1905000"/>
+          </a:xfrm>
+          <a:prstGeom prst="straightConnector1">
+            <a:avLst/>
+          </a:prstGeom>
+          <a:ln w="25400">
+            <a:solidFill>
+              <a:schemeClr val="tx1"/>
+            </a:solidFill>
+            <a:tailEnd type="triangle" w="lg" len="lg"/>
+          </a:ln>
+        </p:spPr>
+        <p:style>
+          <a:lnRef idx="1">
+            <a:schemeClr val="accent1"/>
+          </a:lnRef>
+          <a:fillRef idx="0">
+            <a:schemeClr val="accent1"/>
+          </a:fillRef>
+          <a:effectRef idx="0">
+            <a:schemeClr val="accent1"/>
+          </a:effectRef>
+          <a:fontRef idx="minor">
+            <a:schemeClr val="tx1"/>
+          </a:fontRef>
+        </p:style>
+      </p:cxnSp>
+      <p:cxnSp>
+        <p:nvCxnSpPr>
+          <p:cNvPr id="30" name="Straight Arrow Connector 29"/>
+          <p:cNvCxnSpPr>
+            <a:stCxn id="8" idx="2"/>
+            <a:endCxn id="5" idx="0"/>
+          </p:cNvCxnSpPr>
+          <p:nvPr/>
+        </p:nvCxnSpPr>
+        <p:spPr>
+          <a:xfrm>
+            <a:off x="5029200" y="2095500"/>
+            <a:ext cx="0" cy="533400"/>
+          </a:xfrm>
+          <a:prstGeom prst="straightConnector1">
+            <a:avLst/>
+          </a:prstGeom>
+          <a:ln w="25400">
+            <a:solidFill>
+              <a:schemeClr val="tx1"/>
+            </a:solidFill>
+            <a:tailEnd type="triangle" w="lg" len="lg"/>
+          </a:ln>
+        </p:spPr>
+        <p:style>
+          <a:lnRef idx="1">
+            <a:schemeClr val="accent1"/>
+          </a:lnRef>
+          <a:fillRef idx="0">
+            <a:schemeClr val="accent1"/>
+          </a:fillRef>
+          <a:effectRef idx="0">
+            <a:schemeClr val="accent1"/>
+          </a:effectRef>
+          <a:fontRef idx="minor">
+            <a:schemeClr val="tx1"/>
+          </a:fontRef>
+        </p:style>
+      </p:cxnSp>
+      <p:cxnSp>
+        <p:nvCxnSpPr>
+          <p:cNvPr id="32" name="Straight Arrow Connector 31"/>
+          <p:cNvCxnSpPr>
+            <a:stCxn id="9" idx="0"/>
+            <a:endCxn id="5" idx="2"/>
+          </p:cNvCxnSpPr>
+          <p:nvPr/>
+        </p:nvCxnSpPr>
+        <p:spPr>
+          <a:xfrm flipV="1">
+            <a:off x="5029200" y="3086100"/>
+            <a:ext cx="0" cy="609600"/>
           </a:xfrm>
           <a:prstGeom prst="straightConnector1">
             <a:avLst/>
@@ -3758,6 +3759,1020 @@
     <p:extLst>
       <p:ext uri="{BB962C8B-B14F-4D97-AF65-F5344CB8AC3E}">
         <p14:creationId xmlns:p14="http://schemas.microsoft.com/office/powerpoint/2010/main" val="2449230172"/>
+      </p:ext>
+    </p:extLst>
+  </p:cSld>
+  <p:clrMapOvr>
+    <a:masterClrMapping/>
+  </p:clrMapOvr>
+</p:sld>
+</file>
+
+<file path=ppt/slides/slide2.xml><?xml version="1.0" encoding="utf-8"?>
+<p:sld xmlns:a="http://schemas.openxmlformats.org/drawingml/2006/main" xmlns:r="http://schemas.openxmlformats.org/officeDocument/2006/relationships" xmlns:p="http://schemas.openxmlformats.org/presentationml/2006/main">
+  <p:cSld>
+    <p:spTree>
+      <p:nvGrpSpPr>
+        <p:cNvPr id="1" name=""/>
+        <p:cNvGrpSpPr/>
+        <p:nvPr/>
+      </p:nvGrpSpPr>
+      <p:grpSpPr>
+        <a:xfrm>
+          <a:off x="0" y="0"/>
+          <a:ext cx="0" cy="0"/>
+          <a:chOff x="0" y="0"/>
+          <a:chExt cx="0" cy="0"/>
+        </a:xfrm>
+      </p:grpSpPr>
+      <p:sp>
+        <p:nvSpPr>
+          <p:cNvPr id="4" name="Rounded Rectangle 3"/>
+          <p:cNvSpPr/>
+          <p:nvPr/>
+        </p:nvSpPr>
+        <p:spPr>
+          <a:xfrm>
+            <a:off x="6781800" y="2628900"/>
+            <a:ext cx="1371600" cy="457200"/>
+          </a:xfrm>
+          <a:prstGeom prst="roundRect">
+            <a:avLst/>
+          </a:prstGeom>
+        </p:spPr>
+        <p:style>
+          <a:lnRef idx="2">
+            <a:schemeClr val="accent1">
+              <a:shade val="50000"/>
+            </a:schemeClr>
+          </a:lnRef>
+          <a:fillRef idx="1">
+            <a:schemeClr val="accent1"/>
+          </a:fillRef>
+          <a:effectRef idx="0">
+            <a:schemeClr val="accent1"/>
+          </a:effectRef>
+          <a:fontRef idx="minor">
+            <a:schemeClr val="lt1"/>
+          </a:fontRef>
+        </p:style>
+        <p:txBody>
+          <a:bodyPr rtlCol="0" anchor="ctr"/>
+          <a:lstStyle/>
+          <a:p>
+            <a:pPr algn="ctr"/>
+            <a:r>
+              <a:rPr lang="en-US" dirty="0" err="1" smtClean="0"/>
+              <a:t>CRECEIVEtr</a:t>
+            </a:r>
+            <a:endParaRPr lang="en-US" dirty="0"/>
+          </a:p>
+        </p:txBody>
+      </p:sp>
+      <p:sp>
+        <p:nvSpPr>
+          <p:cNvPr id="5" name="Rounded Rectangle 4"/>
+          <p:cNvSpPr/>
+          <p:nvPr/>
+        </p:nvSpPr>
+        <p:spPr>
+          <a:xfrm>
+            <a:off x="4343400" y="2628900"/>
+            <a:ext cx="1371600" cy="457200"/>
+          </a:xfrm>
+          <a:prstGeom prst="roundRect">
+            <a:avLst/>
+          </a:prstGeom>
+        </p:spPr>
+        <p:style>
+          <a:lnRef idx="2">
+            <a:schemeClr val="accent1">
+              <a:shade val="50000"/>
+            </a:schemeClr>
+          </a:lnRef>
+          <a:fillRef idx="1">
+            <a:schemeClr val="accent1"/>
+          </a:fillRef>
+          <a:effectRef idx="0">
+            <a:schemeClr val="accent1"/>
+          </a:effectRef>
+          <a:fontRef idx="minor">
+            <a:schemeClr val="lt1"/>
+          </a:fontRef>
+        </p:style>
+        <p:txBody>
+          <a:bodyPr rtlCol="0" anchor="ctr"/>
+          <a:lstStyle/>
+          <a:p>
+            <a:pPr algn="ctr"/>
+            <a:r>
+              <a:rPr lang="en-US" dirty="0" smtClean="0"/>
+              <a:t>CLAIMS</a:t>
+            </a:r>
+            <a:endParaRPr lang="en-US" dirty="0"/>
+          </a:p>
+        </p:txBody>
+      </p:sp>
+      <p:sp>
+        <p:nvSpPr>
+          <p:cNvPr id="6" name="Rounded Rectangle 5"/>
+          <p:cNvSpPr/>
+          <p:nvPr/>
+        </p:nvSpPr>
+        <p:spPr>
+          <a:xfrm>
+            <a:off x="1143000" y="4533900"/>
+            <a:ext cx="1371600" cy="457200"/>
+          </a:xfrm>
+          <a:prstGeom prst="roundRect">
+            <a:avLst/>
+          </a:prstGeom>
+        </p:spPr>
+        <p:style>
+          <a:lnRef idx="2">
+            <a:schemeClr val="accent1">
+              <a:shade val="50000"/>
+            </a:schemeClr>
+          </a:lnRef>
+          <a:fillRef idx="1">
+            <a:schemeClr val="accent1"/>
+          </a:fillRef>
+          <a:effectRef idx="0">
+            <a:schemeClr val="accent1"/>
+          </a:effectRef>
+          <a:fontRef idx="minor">
+            <a:schemeClr val="lt1"/>
+          </a:fontRef>
+        </p:style>
+        <p:txBody>
+          <a:bodyPr rtlCol="0" anchor="ctr"/>
+          <a:lstStyle/>
+          <a:p>
+            <a:pPr algn="ctr"/>
+            <a:r>
+              <a:rPr lang="en-US" dirty="0" smtClean="0"/>
+              <a:t>ORIGINAL</a:t>
+            </a:r>
+            <a:endParaRPr lang="en-US" dirty="0"/>
+          </a:p>
+        </p:txBody>
+      </p:sp>
+      <p:sp>
+        <p:nvSpPr>
+          <p:cNvPr id="7" name="Rounded Rectangle 6"/>
+          <p:cNvSpPr/>
+          <p:nvPr/>
+        </p:nvSpPr>
+        <p:spPr>
+          <a:xfrm>
+            <a:off x="1143000" y="800100"/>
+            <a:ext cx="1371600" cy="457200"/>
+          </a:xfrm>
+          <a:prstGeom prst="roundRect">
+            <a:avLst/>
+          </a:prstGeom>
+        </p:spPr>
+        <p:style>
+          <a:lnRef idx="2">
+            <a:schemeClr val="accent1">
+              <a:shade val="50000"/>
+            </a:schemeClr>
+          </a:lnRef>
+          <a:fillRef idx="1">
+            <a:schemeClr val="accent1"/>
+          </a:fillRef>
+          <a:effectRef idx="0">
+            <a:schemeClr val="accent1"/>
+          </a:effectRef>
+          <a:fontRef idx="minor">
+            <a:schemeClr val="lt1"/>
+          </a:fontRef>
+        </p:style>
+        <p:txBody>
+          <a:bodyPr rtlCol="0" anchor="ctr"/>
+          <a:lstStyle/>
+          <a:p>
+            <a:pPr algn="ctr"/>
+            <a:r>
+              <a:rPr lang="en-US" dirty="0" smtClean="0"/>
+              <a:t>GENERAL</a:t>
+            </a:r>
+            <a:endParaRPr lang="en-US" dirty="0"/>
+          </a:p>
+        </p:txBody>
+      </p:sp>
+      <p:sp>
+        <p:nvSpPr>
+          <p:cNvPr id="8" name="Rounded Rectangle 7"/>
+          <p:cNvSpPr/>
+          <p:nvPr/>
+        </p:nvSpPr>
+        <p:spPr>
+          <a:xfrm>
+            <a:off x="4343400" y="1638300"/>
+            <a:ext cx="1371600" cy="457200"/>
+          </a:xfrm>
+          <a:prstGeom prst="roundRect">
+            <a:avLst/>
+          </a:prstGeom>
+        </p:spPr>
+        <p:style>
+          <a:lnRef idx="2">
+            <a:schemeClr val="accent1">
+              <a:shade val="50000"/>
+            </a:schemeClr>
+          </a:lnRef>
+          <a:fillRef idx="1">
+            <a:schemeClr val="accent1"/>
+          </a:fillRef>
+          <a:effectRef idx="0">
+            <a:schemeClr val="accent1"/>
+          </a:effectRef>
+          <a:fontRef idx="minor">
+            <a:schemeClr val="lt1"/>
+          </a:fontRef>
+        </p:style>
+        <p:txBody>
+          <a:bodyPr rtlCol="0" anchor="ctr"/>
+          <a:lstStyle/>
+          <a:p>
+            <a:pPr algn="ctr"/>
+            <a:r>
+              <a:rPr lang="en-US" dirty="0" smtClean="0"/>
+              <a:t>GYEAR</a:t>
+            </a:r>
+            <a:endParaRPr lang="en-US" dirty="0"/>
+          </a:p>
+        </p:txBody>
+      </p:sp>
+      <p:sp>
+        <p:nvSpPr>
+          <p:cNvPr id="9" name="Rounded Rectangle 8"/>
+          <p:cNvSpPr/>
+          <p:nvPr/>
+        </p:nvSpPr>
+        <p:spPr>
+          <a:xfrm>
+            <a:off x="4343400" y="3695700"/>
+            <a:ext cx="1371600" cy="457200"/>
+          </a:xfrm>
+          <a:prstGeom prst="roundRect">
+            <a:avLst/>
+          </a:prstGeom>
+        </p:spPr>
+        <p:style>
+          <a:lnRef idx="2">
+            <a:schemeClr val="accent1">
+              <a:shade val="50000"/>
+            </a:schemeClr>
+          </a:lnRef>
+          <a:fillRef idx="1">
+            <a:schemeClr val="accent1"/>
+          </a:fillRef>
+          <a:effectRef idx="0">
+            <a:schemeClr val="accent1"/>
+          </a:effectRef>
+          <a:fontRef idx="minor">
+            <a:schemeClr val="lt1"/>
+          </a:fontRef>
+        </p:style>
+        <p:txBody>
+          <a:bodyPr rtlCol="0" anchor="ctr"/>
+          <a:lstStyle/>
+          <a:p>
+            <a:pPr algn="ctr"/>
+            <a:r>
+              <a:rPr lang="en-US" dirty="0" smtClean="0"/>
+              <a:t>RATIOCIT</a:t>
+            </a:r>
+            <a:endParaRPr lang="en-US" dirty="0"/>
+          </a:p>
+        </p:txBody>
+      </p:sp>
+      <p:cxnSp>
+        <p:nvCxnSpPr>
+          <p:cNvPr id="11" name="Straight Arrow Connector 10"/>
+          <p:cNvCxnSpPr>
+            <a:stCxn id="5" idx="3"/>
+            <a:endCxn id="4" idx="1"/>
+          </p:cNvCxnSpPr>
+          <p:nvPr/>
+        </p:nvCxnSpPr>
+        <p:spPr>
+          <a:xfrm>
+            <a:off x="5715000" y="2857500"/>
+            <a:ext cx="1066800" cy="0"/>
+          </a:xfrm>
+          <a:prstGeom prst="straightConnector1">
+            <a:avLst/>
+          </a:prstGeom>
+          <a:ln w="25400">
+            <a:solidFill>
+              <a:schemeClr val="tx1"/>
+            </a:solidFill>
+            <a:tailEnd type="triangle" w="lg" len="lg"/>
+          </a:ln>
+        </p:spPr>
+        <p:style>
+          <a:lnRef idx="1">
+            <a:schemeClr val="accent1"/>
+          </a:lnRef>
+          <a:fillRef idx="0">
+            <a:schemeClr val="accent1"/>
+          </a:fillRef>
+          <a:effectRef idx="0">
+            <a:schemeClr val="accent1"/>
+          </a:effectRef>
+          <a:fontRef idx="minor">
+            <a:schemeClr val="tx1"/>
+          </a:fontRef>
+        </p:style>
+      </p:cxnSp>
+      <p:cxnSp>
+        <p:nvCxnSpPr>
+          <p:cNvPr id="21" name="Straight Arrow Connector 20"/>
+          <p:cNvCxnSpPr>
+            <a:stCxn id="9" idx="3"/>
+            <a:endCxn id="4" idx="1"/>
+          </p:cNvCxnSpPr>
+          <p:nvPr/>
+        </p:nvCxnSpPr>
+        <p:spPr>
+          <a:xfrm flipV="1">
+            <a:off x="5715000" y="2857500"/>
+            <a:ext cx="1066800" cy="1066800"/>
+          </a:xfrm>
+          <a:prstGeom prst="straightConnector1">
+            <a:avLst/>
+          </a:prstGeom>
+          <a:ln w="25400">
+            <a:solidFill>
+              <a:schemeClr val="tx1"/>
+            </a:solidFill>
+            <a:tailEnd type="triangle" w="lg" len="lg"/>
+          </a:ln>
+        </p:spPr>
+        <p:style>
+          <a:lnRef idx="1">
+            <a:schemeClr val="accent1"/>
+          </a:lnRef>
+          <a:fillRef idx="0">
+            <a:schemeClr val="accent1"/>
+          </a:fillRef>
+          <a:effectRef idx="0">
+            <a:schemeClr val="accent1"/>
+          </a:effectRef>
+          <a:fontRef idx="minor">
+            <a:schemeClr val="tx1"/>
+          </a:fontRef>
+        </p:style>
+      </p:cxnSp>
+      <p:cxnSp>
+        <p:nvCxnSpPr>
+          <p:cNvPr id="23" name="Straight Arrow Connector 22"/>
+          <p:cNvCxnSpPr>
+            <a:stCxn id="8" idx="3"/>
+            <a:endCxn id="4" idx="1"/>
+          </p:cNvCxnSpPr>
+          <p:nvPr/>
+        </p:nvCxnSpPr>
+        <p:spPr>
+          <a:xfrm>
+            <a:off x="5715000" y="1866900"/>
+            <a:ext cx="1066800" cy="990600"/>
+          </a:xfrm>
+          <a:prstGeom prst="straightConnector1">
+            <a:avLst/>
+          </a:prstGeom>
+          <a:ln w="25400">
+            <a:solidFill>
+              <a:schemeClr val="tx1"/>
+            </a:solidFill>
+            <a:tailEnd type="triangle" w="lg" len="lg"/>
+          </a:ln>
+        </p:spPr>
+        <p:style>
+          <a:lnRef idx="1">
+            <a:schemeClr val="accent1"/>
+          </a:lnRef>
+          <a:fillRef idx="0">
+            <a:schemeClr val="accent1"/>
+          </a:fillRef>
+          <a:effectRef idx="0">
+            <a:schemeClr val="accent1"/>
+          </a:effectRef>
+          <a:fontRef idx="minor">
+            <a:schemeClr val="tx1"/>
+          </a:fontRef>
+        </p:style>
+      </p:cxnSp>
+      <p:cxnSp>
+        <p:nvCxnSpPr>
+          <p:cNvPr id="25" name="Elbow Connector 24"/>
+          <p:cNvCxnSpPr>
+            <a:stCxn id="7" idx="3"/>
+            <a:endCxn id="4" idx="0"/>
+          </p:cNvCxnSpPr>
+          <p:nvPr/>
+        </p:nvCxnSpPr>
+        <p:spPr>
+          <a:xfrm>
+            <a:off x="2514600" y="1028700"/>
+            <a:ext cx="4953000" cy="1600200"/>
+          </a:xfrm>
+          <a:prstGeom prst="bentConnector2">
+            <a:avLst/>
+          </a:prstGeom>
+          <a:ln w="25400">
+            <a:solidFill>
+              <a:schemeClr val="tx1"/>
+            </a:solidFill>
+            <a:tailEnd type="triangle" w="lg" len="lg"/>
+          </a:ln>
+        </p:spPr>
+        <p:style>
+          <a:lnRef idx="1">
+            <a:schemeClr val="accent1"/>
+          </a:lnRef>
+          <a:fillRef idx="0">
+            <a:schemeClr val="accent1"/>
+          </a:fillRef>
+          <a:effectRef idx="0">
+            <a:schemeClr val="accent1"/>
+          </a:effectRef>
+          <a:fontRef idx="minor">
+            <a:schemeClr val="tx1"/>
+          </a:fontRef>
+        </p:style>
+      </p:cxnSp>
+      <p:cxnSp>
+        <p:nvCxnSpPr>
+          <p:cNvPr id="27" name="Elbow Connector 26"/>
+          <p:cNvCxnSpPr>
+            <a:stCxn id="6" idx="3"/>
+            <a:endCxn id="4" idx="2"/>
+          </p:cNvCxnSpPr>
+          <p:nvPr/>
+        </p:nvCxnSpPr>
+        <p:spPr>
+          <a:xfrm flipV="1">
+            <a:off x="2514600" y="3086100"/>
+            <a:ext cx="4953000" cy="1676400"/>
+          </a:xfrm>
+          <a:prstGeom prst="bentConnector2">
+            <a:avLst/>
+          </a:prstGeom>
+          <a:ln w="25400">
+            <a:solidFill>
+              <a:schemeClr val="tx1"/>
+            </a:solidFill>
+            <a:tailEnd type="triangle" w="lg" len="lg"/>
+          </a:ln>
+        </p:spPr>
+        <p:style>
+          <a:lnRef idx="1">
+            <a:schemeClr val="accent1"/>
+          </a:lnRef>
+          <a:fillRef idx="0">
+            <a:schemeClr val="accent1"/>
+          </a:fillRef>
+          <a:effectRef idx="0">
+            <a:schemeClr val="accent1"/>
+          </a:effectRef>
+          <a:fontRef idx="minor">
+            <a:schemeClr val="tx1"/>
+          </a:fontRef>
+        </p:style>
+      </p:cxnSp>
+      <p:cxnSp>
+        <p:nvCxnSpPr>
+          <p:cNvPr id="29" name="Straight Arrow Connector 28"/>
+          <p:cNvCxnSpPr>
+            <a:stCxn id="6" idx="0"/>
+            <a:endCxn id="7" idx="2"/>
+          </p:cNvCxnSpPr>
+          <p:nvPr/>
+        </p:nvCxnSpPr>
+        <p:spPr>
+          <a:xfrm flipV="1">
+            <a:off x="1828800" y="1257300"/>
+            <a:ext cx="0" cy="3276600"/>
+          </a:xfrm>
+          <a:prstGeom prst="straightConnector1">
+            <a:avLst/>
+          </a:prstGeom>
+          <a:ln w="25400">
+            <a:solidFill>
+              <a:schemeClr val="tx1"/>
+            </a:solidFill>
+            <a:tailEnd type="triangle" w="lg" len="lg"/>
+          </a:ln>
+        </p:spPr>
+        <p:style>
+          <a:lnRef idx="1">
+            <a:schemeClr val="accent1"/>
+          </a:lnRef>
+          <a:fillRef idx="0">
+            <a:schemeClr val="accent1"/>
+          </a:fillRef>
+          <a:effectRef idx="0">
+            <a:schemeClr val="accent1"/>
+          </a:effectRef>
+          <a:fontRef idx="minor">
+            <a:schemeClr val="tx1"/>
+          </a:fontRef>
+        </p:style>
+      </p:cxnSp>
+      <p:cxnSp>
+        <p:nvCxnSpPr>
+          <p:cNvPr id="22" name="Straight Arrow Connector 21"/>
+          <p:cNvCxnSpPr>
+            <a:stCxn id="7" idx="3"/>
+            <a:endCxn id="5" idx="1"/>
+          </p:cNvCxnSpPr>
+          <p:nvPr/>
+        </p:nvCxnSpPr>
+        <p:spPr>
+          <a:xfrm>
+            <a:off x="2514600" y="1028700"/>
+            <a:ext cx="1828800" cy="1828800"/>
+          </a:xfrm>
+          <a:prstGeom prst="straightConnector1">
+            <a:avLst/>
+          </a:prstGeom>
+          <a:ln w="25400">
+            <a:solidFill>
+              <a:schemeClr val="tx1"/>
+            </a:solidFill>
+            <a:tailEnd type="triangle" w="lg" len="lg"/>
+          </a:ln>
+        </p:spPr>
+        <p:style>
+          <a:lnRef idx="1">
+            <a:schemeClr val="accent1"/>
+          </a:lnRef>
+          <a:fillRef idx="0">
+            <a:schemeClr val="accent1"/>
+          </a:fillRef>
+          <a:effectRef idx="0">
+            <a:schemeClr val="accent1"/>
+          </a:effectRef>
+          <a:fontRef idx="minor">
+            <a:schemeClr val="tx1"/>
+          </a:fontRef>
+        </p:style>
+      </p:cxnSp>
+      <p:cxnSp>
+        <p:nvCxnSpPr>
+          <p:cNvPr id="26" name="Straight Arrow Connector 25"/>
+          <p:cNvCxnSpPr>
+            <a:stCxn id="6" idx="3"/>
+            <a:endCxn id="5" idx="1"/>
+          </p:cNvCxnSpPr>
+          <p:nvPr/>
+        </p:nvCxnSpPr>
+        <p:spPr>
+          <a:xfrm flipV="1">
+            <a:off x="2514600" y="2857500"/>
+            <a:ext cx="1828800" cy="1905000"/>
+          </a:xfrm>
+          <a:prstGeom prst="straightConnector1">
+            <a:avLst/>
+          </a:prstGeom>
+          <a:ln w="25400">
+            <a:solidFill>
+              <a:schemeClr val="tx1"/>
+            </a:solidFill>
+            <a:tailEnd type="triangle" w="lg" len="lg"/>
+          </a:ln>
+        </p:spPr>
+        <p:style>
+          <a:lnRef idx="1">
+            <a:schemeClr val="accent1"/>
+          </a:lnRef>
+          <a:fillRef idx="0">
+            <a:schemeClr val="accent1"/>
+          </a:fillRef>
+          <a:effectRef idx="0">
+            <a:schemeClr val="accent1"/>
+          </a:effectRef>
+          <a:fontRef idx="minor">
+            <a:schemeClr val="tx1"/>
+          </a:fontRef>
+        </p:style>
+      </p:cxnSp>
+      <p:cxnSp>
+        <p:nvCxnSpPr>
+          <p:cNvPr id="30" name="Straight Arrow Connector 29"/>
+          <p:cNvCxnSpPr>
+            <a:stCxn id="8" idx="2"/>
+            <a:endCxn id="5" idx="0"/>
+          </p:cNvCxnSpPr>
+          <p:nvPr/>
+        </p:nvCxnSpPr>
+        <p:spPr>
+          <a:xfrm>
+            <a:off x="5029200" y="2095500"/>
+            <a:ext cx="0" cy="533400"/>
+          </a:xfrm>
+          <a:prstGeom prst="straightConnector1">
+            <a:avLst/>
+          </a:prstGeom>
+          <a:ln w="25400">
+            <a:solidFill>
+              <a:schemeClr val="tx1"/>
+            </a:solidFill>
+            <a:tailEnd type="triangle" w="lg" len="lg"/>
+          </a:ln>
+        </p:spPr>
+        <p:style>
+          <a:lnRef idx="1">
+            <a:schemeClr val="accent1"/>
+          </a:lnRef>
+          <a:fillRef idx="0">
+            <a:schemeClr val="accent1"/>
+          </a:fillRef>
+          <a:effectRef idx="0">
+            <a:schemeClr val="accent1"/>
+          </a:effectRef>
+          <a:fontRef idx="minor">
+            <a:schemeClr val="tx1"/>
+          </a:fontRef>
+        </p:style>
+      </p:cxnSp>
+      <p:cxnSp>
+        <p:nvCxnSpPr>
+          <p:cNvPr id="32" name="Straight Arrow Connector 31"/>
+          <p:cNvCxnSpPr>
+            <a:stCxn id="9" idx="0"/>
+            <a:endCxn id="5" idx="2"/>
+          </p:cNvCxnSpPr>
+          <p:nvPr/>
+        </p:nvCxnSpPr>
+        <p:spPr>
+          <a:xfrm flipV="1">
+            <a:off x="5029200" y="3086100"/>
+            <a:ext cx="0" cy="609600"/>
+          </a:xfrm>
+          <a:prstGeom prst="straightConnector1">
+            <a:avLst/>
+          </a:prstGeom>
+          <a:ln w="25400">
+            <a:solidFill>
+              <a:schemeClr val="tx1"/>
+            </a:solidFill>
+            <a:tailEnd type="triangle" w="lg" len="lg"/>
+          </a:ln>
+        </p:spPr>
+        <p:style>
+          <a:lnRef idx="1">
+            <a:schemeClr val="accent1"/>
+          </a:lnRef>
+          <a:fillRef idx="0">
+            <a:schemeClr val="accent1"/>
+          </a:fillRef>
+          <a:effectRef idx="0">
+            <a:schemeClr val="accent1"/>
+          </a:effectRef>
+          <a:fontRef idx="minor">
+            <a:schemeClr val="tx1"/>
+          </a:fontRef>
+        </p:style>
+      </p:cxnSp>
+      <p:sp>
+        <p:nvSpPr>
+          <p:cNvPr id="2" name="TextBox 1"/>
+          <p:cNvSpPr txBox="1"/>
+          <p:nvPr/>
+        </p:nvSpPr>
+        <p:spPr>
+          <a:xfrm>
+            <a:off x="1097280" y="2672834"/>
+            <a:ext cx="914400" cy="369332"/>
+          </a:xfrm>
+          <a:prstGeom prst="rect">
+            <a:avLst/>
+          </a:prstGeom>
+          <a:noFill/>
+        </p:spPr>
+        <p:txBody>
+          <a:bodyPr wrap="square" rtlCol="0">
+            <a:spAutoFit/>
+          </a:bodyPr>
+          <a:lstStyle/>
+          <a:p>
+            <a:r>
+              <a:rPr lang="en-US" dirty="0" smtClean="0"/>
+              <a:t>0.160*</a:t>
+            </a:r>
+            <a:endParaRPr lang="en-US" dirty="0"/>
+          </a:p>
+        </p:txBody>
+      </p:sp>
+      <p:sp>
+        <p:nvSpPr>
+          <p:cNvPr id="19" name="TextBox 18"/>
+          <p:cNvSpPr txBox="1"/>
+          <p:nvPr/>
+        </p:nvSpPr>
+        <p:spPr>
+          <a:xfrm>
+            <a:off x="4572000" y="664167"/>
+            <a:ext cx="914400" cy="369332"/>
+          </a:xfrm>
+          <a:prstGeom prst="rect">
+            <a:avLst/>
+          </a:prstGeom>
+          <a:noFill/>
+        </p:spPr>
+        <p:txBody>
+          <a:bodyPr wrap="square" rtlCol="0">
+            <a:spAutoFit/>
+          </a:bodyPr>
+          <a:lstStyle/>
+          <a:p>
+            <a:r>
+              <a:rPr lang="en-US" dirty="0" smtClean="0"/>
+              <a:t>-0.830*</a:t>
+            </a:r>
+            <a:endParaRPr lang="en-US" dirty="0"/>
+          </a:p>
+        </p:txBody>
+      </p:sp>
+      <p:sp>
+        <p:nvSpPr>
+          <p:cNvPr id="20" name="TextBox 19"/>
+          <p:cNvSpPr txBox="1"/>
+          <p:nvPr/>
+        </p:nvSpPr>
+        <p:spPr>
+          <a:xfrm>
+            <a:off x="4610100" y="4760210"/>
+            <a:ext cx="914400" cy="369332"/>
+          </a:xfrm>
+          <a:prstGeom prst="rect">
+            <a:avLst/>
+          </a:prstGeom>
+          <a:noFill/>
+        </p:spPr>
+        <p:txBody>
+          <a:bodyPr wrap="square" rtlCol="0">
+            <a:spAutoFit/>
+          </a:bodyPr>
+          <a:lstStyle/>
+          <a:p>
+            <a:r>
+              <a:rPr lang="en-US" dirty="0" smtClean="0"/>
+              <a:t>0.120*</a:t>
+            </a:r>
+            <a:endParaRPr lang="en-US" dirty="0"/>
+          </a:p>
+        </p:txBody>
+      </p:sp>
+      <p:sp>
+        <p:nvSpPr>
+          <p:cNvPr id="24" name="TextBox 23"/>
+          <p:cNvSpPr txBox="1"/>
+          <p:nvPr/>
+        </p:nvSpPr>
+        <p:spPr>
+          <a:xfrm>
+            <a:off x="3448493" y="1682234"/>
+            <a:ext cx="914400" cy="369332"/>
+          </a:xfrm>
+          <a:prstGeom prst="rect">
+            <a:avLst/>
+          </a:prstGeom>
+          <a:noFill/>
+        </p:spPr>
+        <p:txBody>
+          <a:bodyPr wrap="square" rtlCol="0">
+            <a:spAutoFit/>
+          </a:bodyPr>
+          <a:lstStyle/>
+          <a:p>
+            <a:r>
+              <a:rPr lang="en-US" dirty="0" smtClean="0"/>
+              <a:t>2.806*</a:t>
+            </a:r>
+            <a:endParaRPr lang="en-US" dirty="0"/>
+          </a:p>
+        </p:txBody>
+      </p:sp>
+      <p:sp>
+        <p:nvSpPr>
+          <p:cNvPr id="28" name="TextBox 27"/>
+          <p:cNvSpPr txBox="1"/>
+          <p:nvPr/>
+        </p:nvSpPr>
+        <p:spPr>
+          <a:xfrm>
+            <a:off x="3448493" y="3751153"/>
+            <a:ext cx="914400" cy="369332"/>
+          </a:xfrm>
+          <a:prstGeom prst="rect">
+            <a:avLst/>
+          </a:prstGeom>
+          <a:noFill/>
+        </p:spPr>
+        <p:txBody>
+          <a:bodyPr wrap="square" rtlCol="0">
+            <a:spAutoFit/>
+          </a:bodyPr>
+          <a:lstStyle/>
+          <a:p>
+            <a:r>
+              <a:rPr lang="en-US" dirty="0" smtClean="0"/>
+              <a:t>4.311*</a:t>
+            </a:r>
+            <a:endParaRPr lang="en-US" dirty="0"/>
+          </a:p>
+        </p:txBody>
+      </p:sp>
+      <p:sp>
+        <p:nvSpPr>
+          <p:cNvPr id="31" name="TextBox 30"/>
+          <p:cNvSpPr txBox="1"/>
+          <p:nvPr/>
+        </p:nvSpPr>
+        <p:spPr>
+          <a:xfrm>
+            <a:off x="5075274" y="2136995"/>
+            <a:ext cx="914400" cy="369332"/>
+          </a:xfrm>
+          <a:prstGeom prst="rect">
+            <a:avLst/>
+          </a:prstGeom>
+          <a:noFill/>
+        </p:spPr>
+        <p:txBody>
+          <a:bodyPr wrap="square" rtlCol="0">
+            <a:spAutoFit/>
+          </a:bodyPr>
+          <a:lstStyle/>
+          <a:p>
+            <a:r>
+              <a:rPr lang="en-US" dirty="0" smtClean="0"/>
+              <a:t>0.505*</a:t>
+            </a:r>
+            <a:endParaRPr lang="en-US" dirty="0"/>
+          </a:p>
+        </p:txBody>
+      </p:sp>
+      <p:sp>
+        <p:nvSpPr>
+          <p:cNvPr id="33" name="TextBox 32"/>
+          <p:cNvSpPr txBox="1"/>
+          <p:nvPr/>
+        </p:nvSpPr>
+        <p:spPr>
+          <a:xfrm>
+            <a:off x="5078818" y="3238500"/>
+            <a:ext cx="914400" cy="369332"/>
+          </a:xfrm>
+          <a:prstGeom prst="rect">
+            <a:avLst/>
+          </a:prstGeom>
+          <a:noFill/>
+        </p:spPr>
+        <p:txBody>
+          <a:bodyPr wrap="square" rtlCol="0">
+            <a:spAutoFit/>
+          </a:bodyPr>
+          <a:lstStyle/>
+          <a:p>
+            <a:r>
+              <a:rPr lang="en-US" dirty="0" smtClean="0"/>
+              <a:t>3.650*</a:t>
+            </a:r>
+            <a:endParaRPr lang="en-US" dirty="0"/>
+          </a:p>
+        </p:txBody>
+      </p:sp>
+      <p:sp>
+        <p:nvSpPr>
+          <p:cNvPr id="34" name="TextBox 33"/>
+          <p:cNvSpPr txBox="1"/>
+          <p:nvPr/>
+        </p:nvSpPr>
+        <p:spPr>
+          <a:xfrm>
+            <a:off x="5715000" y="2552700"/>
+            <a:ext cx="914400" cy="369332"/>
+          </a:xfrm>
+          <a:prstGeom prst="rect">
+            <a:avLst/>
+          </a:prstGeom>
+          <a:noFill/>
+        </p:spPr>
+        <p:txBody>
+          <a:bodyPr wrap="square" rtlCol="0">
+            <a:spAutoFit/>
+          </a:bodyPr>
+          <a:lstStyle/>
+          <a:p>
+            <a:r>
+              <a:rPr lang="en-US" dirty="0" smtClean="0"/>
+              <a:t>-0.001*</a:t>
+            </a:r>
+            <a:endParaRPr lang="en-US" dirty="0"/>
+          </a:p>
+        </p:txBody>
+      </p:sp>
+      <p:sp>
+        <p:nvSpPr>
+          <p:cNvPr id="35" name="TextBox 34"/>
+          <p:cNvSpPr txBox="1"/>
+          <p:nvPr/>
+        </p:nvSpPr>
+        <p:spPr>
+          <a:xfrm>
+            <a:off x="6172200" y="1943100"/>
+            <a:ext cx="914400" cy="369332"/>
+          </a:xfrm>
+          <a:prstGeom prst="rect">
+            <a:avLst/>
+          </a:prstGeom>
+          <a:noFill/>
+        </p:spPr>
+        <p:txBody>
+          <a:bodyPr wrap="square" rtlCol="0">
+            <a:spAutoFit/>
+          </a:bodyPr>
+          <a:lstStyle/>
+          <a:p>
+            <a:r>
+              <a:rPr lang="en-US" dirty="0" smtClean="0"/>
+              <a:t>0.062*</a:t>
+            </a:r>
+            <a:endParaRPr lang="en-US" dirty="0"/>
+          </a:p>
+        </p:txBody>
+      </p:sp>
+      <p:sp>
+        <p:nvSpPr>
+          <p:cNvPr id="36" name="TextBox 35"/>
+          <p:cNvSpPr txBox="1"/>
+          <p:nvPr/>
+        </p:nvSpPr>
+        <p:spPr>
+          <a:xfrm>
+            <a:off x="6172200" y="3445467"/>
+            <a:ext cx="914400" cy="369332"/>
+          </a:xfrm>
+          <a:prstGeom prst="rect">
+            <a:avLst/>
+          </a:prstGeom>
+          <a:noFill/>
+        </p:spPr>
+        <p:txBody>
+          <a:bodyPr wrap="square" rtlCol="0">
+            <a:spAutoFit/>
+          </a:bodyPr>
+          <a:lstStyle/>
+          <a:p>
+            <a:r>
+              <a:rPr lang="en-US" dirty="0" smtClean="0"/>
+              <a:t>-0.205*</a:t>
+            </a:r>
+            <a:endParaRPr lang="en-US" dirty="0"/>
+          </a:p>
+        </p:txBody>
+      </p:sp>
+      <p:sp>
+        <p:nvSpPr>
+          <p:cNvPr id="3" name="TextBox 2"/>
+          <p:cNvSpPr txBox="1"/>
+          <p:nvPr/>
+        </p:nvSpPr>
+        <p:spPr>
+          <a:xfrm>
+            <a:off x="1142999" y="5230183"/>
+            <a:ext cx="3886201" cy="369332"/>
+          </a:xfrm>
+          <a:prstGeom prst="rect">
+            <a:avLst/>
+          </a:prstGeom>
+          <a:noFill/>
+        </p:spPr>
+        <p:txBody>
+          <a:bodyPr wrap="square" rtlCol="0">
+            <a:spAutoFit/>
+          </a:bodyPr>
+          <a:lstStyle/>
+          <a:p>
+            <a:r>
+              <a:rPr lang="en-US" dirty="0" smtClean="0"/>
+              <a:t>* p&lt;0.05, ** p&lt;0.01, *** p&lt;0.001</a:t>
+            </a:r>
+            <a:endParaRPr lang="en-US" dirty="0"/>
+          </a:p>
+        </p:txBody>
+      </p:sp>
+    </p:spTree>
+    <p:extLst>
+      <p:ext uri="{BB962C8B-B14F-4D97-AF65-F5344CB8AC3E}">
+        <p14:creationId xmlns:p14="http://schemas.microsoft.com/office/powerpoint/2010/main" val="2495332603"/>
       </p:ext>
     </p:extLst>
   </p:cSld>

</xml_diff>

<commit_message>
Updated Assignment 03 path model
</commit_message>
<xml_diff>
--- a/Assignments/Assignment03/Docs/Townes_SOC6100_Assignment03_PathModel_Diagram_v00.pptx
+++ b/Assignments/Assignment03/Docs/Townes_SOC6100_Assignment03_PathModel_Diagram_v00.pptx
@@ -6,7 +6,7 @@
   </p:sldMasterIdLst>
   <p:sldIdLst>
     <p:sldId id="256" r:id="rId2"/>
-    <p:sldId id="257" r:id="rId3"/>
+    <p:sldId id="258" r:id="rId3"/>
   </p:sldIdLst>
   <p:sldSz cx="9144000" cy="5715000" type="screen16x10"/>
   <p:notesSz cx="7010400" cy="9296400"/>
@@ -289,7 +289,7 @@
           <a:p>
             <a:fld id="{BF30DF70-5848-4672-8949-A08F2F452BE1}" type="datetimeFigureOut">
               <a:rPr lang="en-US" smtClean="0"/>
-              <a:t>10/23/2018</a:t>
+              <a:t>10/24/2018</a:t>
             </a:fld>
             <a:endParaRPr lang="en-US"/>
           </a:p>
@@ -459,7 +459,7 @@
           <a:p>
             <a:fld id="{BF30DF70-5848-4672-8949-A08F2F452BE1}" type="datetimeFigureOut">
               <a:rPr lang="en-US" smtClean="0"/>
-              <a:t>10/23/2018</a:t>
+              <a:t>10/24/2018</a:t>
             </a:fld>
             <a:endParaRPr lang="en-US"/>
           </a:p>
@@ -639,7 +639,7 @@
           <a:p>
             <a:fld id="{BF30DF70-5848-4672-8949-A08F2F452BE1}" type="datetimeFigureOut">
               <a:rPr lang="en-US" smtClean="0"/>
-              <a:t>10/23/2018</a:t>
+              <a:t>10/24/2018</a:t>
             </a:fld>
             <a:endParaRPr lang="en-US"/>
           </a:p>
@@ -809,7 +809,7 @@
           <a:p>
             <a:fld id="{BF30DF70-5848-4672-8949-A08F2F452BE1}" type="datetimeFigureOut">
               <a:rPr lang="en-US" smtClean="0"/>
-              <a:t>10/23/2018</a:t>
+              <a:t>10/24/2018</a:t>
             </a:fld>
             <a:endParaRPr lang="en-US"/>
           </a:p>
@@ -1055,7 +1055,7 @@
           <a:p>
             <a:fld id="{BF30DF70-5848-4672-8949-A08F2F452BE1}" type="datetimeFigureOut">
               <a:rPr lang="en-US" smtClean="0"/>
-              <a:t>10/23/2018</a:t>
+              <a:t>10/24/2018</a:t>
             </a:fld>
             <a:endParaRPr lang="en-US"/>
           </a:p>
@@ -1343,7 +1343,7 @@
           <a:p>
             <a:fld id="{BF30DF70-5848-4672-8949-A08F2F452BE1}" type="datetimeFigureOut">
               <a:rPr lang="en-US" smtClean="0"/>
-              <a:t>10/23/2018</a:t>
+              <a:t>10/24/2018</a:t>
             </a:fld>
             <a:endParaRPr lang="en-US"/>
           </a:p>
@@ -1770,7 +1770,7 @@
           <a:p>
             <a:fld id="{BF30DF70-5848-4672-8949-A08F2F452BE1}" type="datetimeFigureOut">
               <a:rPr lang="en-US" smtClean="0"/>
-              <a:t>10/23/2018</a:t>
+              <a:t>10/24/2018</a:t>
             </a:fld>
             <a:endParaRPr lang="en-US"/>
           </a:p>
@@ -1888,7 +1888,7 @@
           <a:p>
             <a:fld id="{BF30DF70-5848-4672-8949-A08F2F452BE1}" type="datetimeFigureOut">
               <a:rPr lang="en-US" smtClean="0"/>
-              <a:t>10/23/2018</a:t>
+              <a:t>10/24/2018</a:t>
             </a:fld>
             <a:endParaRPr lang="en-US"/>
           </a:p>
@@ -1983,7 +1983,7 @@
           <a:p>
             <a:fld id="{BF30DF70-5848-4672-8949-A08F2F452BE1}" type="datetimeFigureOut">
               <a:rPr lang="en-US" smtClean="0"/>
-              <a:t>10/23/2018</a:t>
+              <a:t>10/24/2018</a:t>
             </a:fld>
             <a:endParaRPr lang="en-US"/>
           </a:p>
@@ -2260,7 +2260,7 @@
           <a:p>
             <a:fld id="{BF30DF70-5848-4672-8949-A08F2F452BE1}" type="datetimeFigureOut">
               <a:rPr lang="en-US" smtClean="0"/>
-              <a:t>10/23/2018</a:t>
+              <a:t>10/24/2018</a:t>
             </a:fld>
             <a:endParaRPr lang="en-US"/>
           </a:p>
@@ -2513,7 +2513,7 @@
           <a:p>
             <a:fld id="{BF30DF70-5848-4672-8949-A08F2F452BE1}" type="datetimeFigureOut">
               <a:rPr lang="en-US" smtClean="0"/>
-              <a:t>10/23/2018</a:t>
+              <a:t>10/24/2018</a:t>
             </a:fld>
             <a:endParaRPr lang="en-US"/>
           </a:p>
@@ -2726,7 +2726,7 @@
           <a:p>
             <a:fld id="{BF30DF70-5848-4672-8949-A08F2F452BE1}" type="datetimeFigureOut">
               <a:rPr lang="en-US" smtClean="0"/>
-              <a:t>10/23/2018</a:t>
+              <a:t>10/24/2018</a:t>
             </a:fld>
             <a:endParaRPr lang="en-US"/>
           </a:p>
@@ -3197,7 +3197,7 @@
         </p:nvSpPr>
         <p:spPr>
           <a:xfrm>
-            <a:off x="1143000" y="4533900"/>
+            <a:off x="685800" y="2628900"/>
             <a:ext cx="1371600" cy="457200"/>
           </a:xfrm>
           <a:prstGeom prst="roundRect">
@@ -3241,7 +3241,7 @@
         </p:nvSpPr>
         <p:spPr>
           <a:xfrm>
-            <a:off x="1143000" y="800100"/>
+            <a:off x="2057400" y="952500"/>
             <a:ext cx="1371600" cy="457200"/>
           </a:xfrm>
           <a:prstGeom prst="roundRect">
@@ -3493,88 +3493,10 @@
         </p:nvCxnSpPr>
         <p:spPr>
           <a:xfrm>
-            <a:off x="2514600" y="1028700"/>
-            <a:ext cx="4953000" cy="1600200"/>
+            <a:off x="3429000" y="1181100"/>
+            <a:ext cx="4038600" cy="1447800"/>
           </a:xfrm>
           <a:prstGeom prst="bentConnector2">
-            <a:avLst/>
-          </a:prstGeom>
-          <a:ln w="25400">
-            <a:solidFill>
-              <a:schemeClr val="tx1"/>
-            </a:solidFill>
-            <a:tailEnd type="triangle" w="lg" len="lg"/>
-          </a:ln>
-        </p:spPr>
-        <p:style>
-          <a:lnRef idx="1">
-            <a:schemeClr val="accent1"/>
-          </a:lnRef>
-          <a:fillRef idx="0">
-            <a:schemeClr val="accent1"/>
-          </a:fillRef>
-          <a:effectRef idx="0">
-            <a:schemeClr val="accent1"/>
-          </a:effectRef>
-          <a:fontRef idx="minor">
-            <a:schemeClr val="tx1"/>
-          </a:fontRef>
-        </p:style>
-      </p:cxnSp>
-      <p:cxnSp>
-        <p:nvCxnSpPr>
-          <p:cNvPr id="27" name="Elbow Connector 26"/>
-          <p:cNvCxnSpPr>
-            <a:stCxn id="6" idx="3"/>
-            <a:endCxn id="4" idx="2"/>
-          </p:cNvCxnSpPr>
-          <p:nvPr/>
-        </p:nvCxnSpPr>
-        <p:spPr>
-          <a:xfrm flipV="1">
-            <a:off x="2514600" y="3086100"/>
-            <a:ext cx="4953000" cy="1676400"/>
-          </a:xfrm>
-          <a:prstGeom prst="bentConnector2">
-            <a:avLst/>
-          </a:prstGeom>
-          <a:ln w="25400">
-            <a:solidFill>
-              <a:schemeClr val="tx1"/>
-            </a:solidFill>
-            <a:tailEnd type="triangle" w="lg" len="lg"/>
-          </a:ln>
-        </p:spPr>
-        <p:style>
-          <a:lnRef idx="1">
-            <a:schemeClr val="accent1"/>
-          </a:lnRef>
-          <a:fillRef idx="0">
-            <a:schemeClr val="accent1"/>
-          </a:fillRef>
-          <a:effectRef idx="0">
-            <a:schemeClr val="accent1"/>
-          </a:effectRef>
-          <a:fontRef idx="minor">
-            <a:schemeClr val="tx1"/>
-          </a:fontRef>
-        </p:style>
-      </p:cxnSp>
-      <p:cxnSp>
-        <p:nvCxnSpPr>
-          <p:cNvPr id="29" name="Straight Arrow Connector 28"/>
-          <p:cNvCxnSpPr>
-            <a:stCxn id="6" idx="0"/>
-            <a:endCxn id="7" idx="2"/>
-          </p:cNvCxnSpPr>
-          <p:nvPr/>
-        </p:nvCxnSpPr>
-        <p:spPr>
-          <a:xfrm flipV="1">
-            <a:off x="1828800" y="1257300"/>
-            <a:ext cx="0" cy="3276600"/>
-          </a:xfrm>
-          <a:prstGeom prst="straightConnector1">
             <a:avLst/>
           </a:prstGeom>
           <a:ln w="25400">
@@ -3603,15 +3525,15 @@
         <p:nvCxnSpPr>
           <p:cNvPr id="22" name="Straight Arrow Connector 21"/>
           <p:cNvCxnSpPr>
-            <a:stCxn id="7" idx="3"/>
+            <a:stCxn id="7" idx="2"/>
             <a:endCxn id="5" idx="1"/>
           </p:cNvCxnSpPr>
           <p:nvPr/>
         </p:nvCxnSpPr>
         <p:spPr>
           <a:xfrm>
-            <a:off x="2514600" y="1028700"/>
-            <a:ext cx="1828800" cy="1828800"/>
+            <a:off x="2743200" y="1409700"/>
+            <a:ext cx="1600200" cy="1447800"/>
           </a:xfrm>
           <a:prstGeom prst="straightConnector1">
             <a:avLst/>
@@ -3648,9 +3570,9 @@
           <p:nvPr/>
         </p:nvCxnSpPr>
         <p:spPr>
-          <a:xfrm flipV="1">
-            <a:off x="2514600" y="2857500"/>
-            <a:ext cx="1828800" cy="1905000"/>
+          <a:xfrm>
+            <a:off x="2057400" y="2857500"/>
+            <a:ext cx="2286000" cy="0"/>
           </a:xfrm>
           <a:prstGeom prst="straightConnector1">
             <a:avLst/>
@@ -3755,6 +3677,116 @@
           </a:fontRef>
         </p:style>
       </p:cxnSp>
+      <p:cxnSp>
+        <p:nvCxnSpPr>
+          <p:cNvPr id="18" name="Elbow Connector 17"/>
+          <p:cNvCxnSpPr>
+            <a:stCxn id="6" idx="2"/>
+            <a:endCxn id="4" idx="2"/>
+          </p:cNvCxnSpPr>
+          <p:nvPr/>
+        </p:nvCxnSpPr>
+        <p:spPr>
+          <a:xfrm rot="16200000" flipH="1">
+            <a:off x="4419600" y="38100"/>
+            <a:ext cx="12700" cy="6096000"/>
+          </a:xfrm>
+          <a:prstGeom prst="bentConnector3">
+            <a:avLst>
+              <a:gd name="adj1" fmla="val 11381953"/>
+            </a:avLst>
+          </a:prstGeom>
+          <a:ln w="25400">
+            <a:solidFill>
+              <a:schemeClr val="tx1"/>
+            </a:solidFill>
+            <a:tailEnd type="triangle" w="lg" len="lg"/>
+          </a:ln>
+        </p:spPr>
+        <p:style>
+          <a:lnRef idx="1">
+            <a:schemeClr val="accent1"/>
+          </a:lnRef>
+          <a:fillRef idx="0">
+            <a:schemeClr val="accent1"/>
+          </a:fillRef>
+          <a:effectRef idx="0">
+            <a:schemeClr val="accent1"/>
+          </a:effectRef>
+          <a:fontRef idx="minor">
+            <a:schemeClr val="tx1"/>
+          </a:fontRef>
+        </p:style>
+      </p:cxnSp>
+      <p:cxnSp>
+        <p:nvCxnSpPr>
+          <p:cNvPr id="24" name="Elbow Connector 23"/>
+          <p:cNvCxnSpPr>
+            <a:stCxn id="6" idx="0"/>
+            <a:endCxn id="7" idx="1"/>
+          </p:cNvCxnSpPr>
+          <p:nvPr/>
+        </p:nvCxnSpPr>
+        <p:spPr>
+          <a:xfrm rot="5400000" flipH="1" flipV="1">
+            <a:off x="990600" y="1562100"/>
+            <a:ext cx="1447800" cy="685800"/>
+          </a:xfrm>
+          <a:prstGeom prst="bentConnector2">
+            <a:avLst/>
+          </a:prstGeom>
+          <a:ln w="25400">
+            <a:solidFill>
+              <a:schemeClr val="tx1"/>
+            </a:solidFill>
+            <a:tailEnd type="triangle" w="lg" len="lg"/>
+          </a:ln>
+        </p:spPr>
+        <p:style>
+          <a:lnRef idx="1">
+            <a:schemeClr val="accent1"/>
+          </a:lnRef>
+          <a:fillRef idx="0">
+            <a:schemeClr val="accent1"/>
+          </a:fillRef>
+          <a:effectRef idx="0">
+            <a:schemeClr val="accent1"/>
+          </a:effectRef>
+          <a:fontRef idx="minor">
+            <a:schemeClr val="tx1"/>
+          </a:fontRef>
+        </p:style>
+      </p:cxnSp>
+      <p:sp>
+        <p:nvSpPr>
+          <p:cNvPr id="35" name="TextBox 34"/>
+          <p:cNvSpPr txBox="1"/>
+          <p:nvPr/>
+        </p:nvSpPr>
+        <p:spPr>
+          <a:xfrm>
+            <a:off x="914400" y="190500"/>
+            <a:ext cx="7315200" cy="369332"/>
+          </a:xfrm>
+          <a:prstGeom prst="rect">
+            <a:avLst/>
+          </a:prstGeom>
+          <a:noFill/>
+        </p:spPr>
+        <p:txBody>
+          <a:bodyPr wrap="square" rtlCol="0">
+            <a:spAutoFit/>
+          </a:bodyPr>
+          <a:lstStyle/>
+          <a:p>
+            <a:pPr algn="ctr"/>
+            <a:r>
+              <a:rPr lang="en-US" b="1" dirty="0" smtClean="0"/>
+              <a:t>Analysis of Path Model</a:t>
+            </a:r>
+          </a:p>
+        </p:txBody>
+      </p:sp>
     </p:spTree>
     <p:extLst>
       <p:ext uri="{BB962C8B-B14F-4D97-AF65-F5344CB8AC3E}">
@@ -3881,7 +3913,7 @@
         </p:nvSpPr>
         <p:spPr>
           <a:xfrm>
-            <a:off x="1143000" y="4533900"/>
+            <a:off x="685800" y="2628900"/>
             <a:ext cx="1371600" cy="457200"/>
           </a:xfrm>
           <a:prstGeom prst="roundRect">
@@ -3925,7 +3957,7 @@
         </p:nvSpPr>
         <p:spPr>
           <a:xfrm>
-            <a:off x="1143000" y="800100"/>
+            <a:off x="2057400" y="952500"/>
             <a:ext cx="1371600" cy="457200"/>
           </a:xfrm>
           <a:prstGeom prst="roundRect">
@@ -4177,88 +4209,10 @@
         </p:nvCxnSpPr>
         <p:spPr>
           <a:xfrm>
-            <a:off x="2514600" y="1028700"/>
-            <a:ext cx="4953000" cy="1600200"/>
+            <a:off x="3429000" y="1181100"/>
+            <a:ext cx="4038600" cy="1447800"/>
           </a:xfrm>
           <a:prstGeom prst="bentConnector2">
-            <a:avLst/>
-          </a:prstGeom>
-          <a:ln w="25400">
-            <a:solidFill>
-              <a:schemeClr val="tx1"/>
-            </a:solidFill>
-            <a:tailEnd type="triangle" w="lg" len="lg"/>
-          </a:ln>
-        </p:spPr>
-        <p:style>
-          <a:lnRef idx="1">
-            <a:schemeClr val="accent1"/>
-          </a:lnRef>
-          <a:fillRef idx="0">
-            <a:schemeClr val="accent1"/>
-          </a:fillRef>
-          <a:effectRef idx="0">
-            <a:schemeClr val="accent1"/>
-          </a:effectRef>
-          <a:fontRef idx="minor">
-            <a:schemeClr val="tx1"/>
-          </a:fontRef>
-        </p:style>
-      </p:cxnSp>
-      <p:cxnSp>
-        <p:nvCxnSpPr>
-          <p:cNvPr id="27" name="Elbow Connector 26"/>
-          <p:cNvCxnSpPr>
-            <a:stCxn id="6" idx="3"/>
-            <a:endCxn id="4" idx="2"/>
-          </p:cNvCxnSpPr>
-          <p:nvPr/>
-        </p:nvCxnSpPr>
-        <p:spPr>
-          <a:xfrm flipV="1">
-            <a:off x="2514600" y="3086100"/>
-            <a:ext cx="4953000" cy="1676400"/>
-          </a:xfrm>
-          <a:prstGeom prst="bentConnector2">
-            <a:avLst/>
-          </a:prstGeom>
-          <a:ln w="25400">
-            <a:solidFill>
-              <a:schemeClr val="tx1"/>
-            </a:solidFill>
-            <a:tailEnd type="triangle" w="lg" len="lg"/>
-          </a:ln>
-        </p:spPr>
-        <p:style>
-          <a:lnRef idx="1">
-            <a:schemeClr val="accent1"/>
-          </a:lnRef>
-          <a:fillRef idx="0">
-            <a:schemeClr val="accent1"/>
-          </a:fillRef>
-          <a:effectRef idx="0">
-            <a:schemeClr val="accent1"/>
-          </a:effectRef>
-          <a:fontRef idx="minor">
-            <a:schemeClr val="tx1"/>
-          </a:fontRef>
-        </p:style>
-      </p:cxnSp>
-      <p:cxnSp>
-        <p:nvCxnSpPr>
-          <p:cNvPr id="29" name="Straight Arrow Connector 28"/>
-          <p:cNvCxnSpPr>
-            <a:stCxn id="6" idx="0"/>
-            <a:endCxn id="7" idx="2"/>
-          </p:cNvCxnSpPr>
-          <p:nvPr/>
-        </p:nvCxnSpPr>
-        <p:spPr>
-          <a:xfrm flipV="1">
-            <a:off x="1828800" y="1257300"/>
-            <a:ext cx="0" cy="3276600"/>
-          </a:xfrm>
-          <a:prstGeom prst="straightConnector1">
             <a:avLst/>
           </a:prstGeom>
           <a:ln w="25400">
@@ -4287,15 +4241,15 @@
         <p:nvCxnSpPr>
           <p:cNvPr id="22" name="Straight Arrow Connector 21"/>
           <p:cNvCxnSpPr>
-            <a:stCxn id="7" idx="3"/>
+            <a:stCxn id="7" idx="2"/>
             <a:endCxn id="5" idx="1"/>
           </p:cNvCxnSpPr>
           <p:nvPr/>
         </p:nvCxnSpPr>
         <p:spPr>
           <a:xfrm>
-            <a:off x="2514600" y="1028700"/>
-            <a:ext cx="1828800" cy="1828800"/>
+            <a:off x="2743200" y="1409700"/>
+            <a:ext cx="1600200" cy="1447800"/>
           </a:xfrm>
           <a:prstGeom prst="straightConnector1">
             <a:avLst/>
@@ -4332,9 +4286,9 @@
           <p:nvPr/>
         </p:nvCxnSpPr>
         <p:spPr>
-          <a:xfrm flipV="1">
-            <a:off x="2514600" y="2857500"/>
-            <a:ext cx="1828800" cy="1905000"/>
+          <a:xfrm>
+            <a:off x="2057400" y="2857500"/>
+            <a:ext cx="2286000" cy="0"/>
           </a:xfrm>
           <a:prstGeom prst="straightConnector1">
             <a:avLst/>
@@ -4439,16 +4393,96 @@
           </a:fontRef>
         </p:style>
       </p:cxnSp>
-      <p:sp>
-        <p:nvSpPr>
-          <p:cNvPr id="2" name="TextBox 1"/>
+      <p:cxnSp>
+        <p:nvCxnSpPr>
+          <p:cNvPr id="18" name="Elbow Connector 17"/>
+          <p:cNvCxnSpPr>
+            <a:stCxn id="6" idx="2"/>
+            <a:endCxn id="4" idx="2"/>
+          </p:cNvCxnSpPr>
+          <p:nvPr/>
+        </p:nvCxnSpPr>
+        <p:spPr>
+          <a:xfrm rot="16200000" flipH="1">
+            <a:off x="4419600" y="38100"/>
+            <a:ext cx="12700" cy="6096000"/>
+          </a:xfrm>
+          <a:prstGeom prst="bentConnector3">
+            <a:avLst>
+              <a:gd name="adj1" fmla="val 11381953"/>
+            </a:avLst>
+          </a:prstGeom>
+          <a:ln w="25400">
+            <a:solidFill>
+              <a:schemeClr val="tx1"/>
+            </a:solidFill>
+            <a:tailEnd type="triangle" w="lg" len="lg"/>
+          </a:ln>
+        </p:spPr>
+        <p:style>
+          <a:lnRef idx="1">
+            <a:schemeClr val="accent1"/>
+          </a:lnRef>
+          <a:fillRef idx="0">
+            <a:schemeClr val="accent1"/>
+          </a:fillRef>
+          <a:effectRef idx="0">
+            <a:schemeClr val="accent1"/>
+          </a:effectRef>
+          <a:fontRef idx="minor">
+            <a:schemeClr val="tx1"/>
+          </a:fontRef>
+        </p:style>
+      </p:cxnSp>
+      <p:cxnSp>
+        <p:nvCxnSpPr>
+          <p:cNvPr id="24" name="Elbow Connector 23"/>
+          <p:cNvCxnSpPr>
+            <a:stCxn id="6" idx="0"/>
+            <a:endCxn id="7" idx="1"/>
+          </p:cNvCxnSpPr>
+          <p:nvPr/>
+        </p:nvCxnSpPr>
+        <p:spPr>
+          <a:xfrm rot="5400000" flipH="1" flipV="1">
+            <a:off x="990600" y="1562100"/>
+            <a:ext cx="1447800" cy="685800"/>
+          </a:xfrm>
+          <a:prstGeom prst="bentConnector2">
+            <a:avLst/>
+          </a:prstGeom>
+          <a:ln w="25400">
+            <a:solidFill>
+              <a:schemeClr val="tx1"/>
+            </a:solidFill>
+            <a:tailEnd type="triangle" w="lg" len="lg"/>
+          </a:ln>
+        </p:spPr>
+        <p:style>
+          <a:lnRef idx="1">
+            <a:schemeClr val="accent1"/>
+          </a:lnRef>
+          <a:fillRef idx="0">
+            <a:schemeClr val="accent1"/>
+          </a:fillRef>
+          <a:effectRef idx="0">
+            <a:schemeClr val="accent1"/>
+          </a:effectRef>
+          <a:fontRef idx="minor">
+            <a:schemeClr val="tx1"/>
+          </a:fontRef>
+        </p:style>
+      </p:cxnSp>
+      <p:sp>
+        <p:nvSpPr>
+          <p:cNvPr id="19" name="TextBox 18"/>
           <p:cNvSpPr txBox="1"/>
           <p:nvPr/>
         </p:nvSpPr>
         <p:spPr>
           <a:xfrm>
-            <a:off x="1097280" y="2672834"/>
-            <a:ext cx="914400" cy="369332"/>
+            <a:off x="685800" y="5242098"/>
+            <a:ext cx="3886201" cy="369332"/>
           </a:xfrm>
           <a:prstGeom prst="rect">
             <a:avLst/>
@@ -4463,7 +4497,7 @@
           <a:p>
             <a:r>
               <a:rPr lang="en-US" dirty="0" smtClean="0"/>
-              <a:t>0.160*</a:t>
+              <a:t>* p&lt;0.05, ** p&lt;0.01, *** p&lt;0.001</a:t>
             </a:r>
             <a:endParaRPr lang="en-US" dirty="0"/>
           </a:p>
@@ -4471,14 +4505,14 @@
       </p:sp>
       <p:sp>
         <p:nvSpPr>
-          <p:cNvPr id="19" name="TextBox 18"/>
+          <p:cNvPr id="20" name="TextBox 19"/>
           <p:cNvSpPr txBox="1"/>
           <p:nvPr/>
         </p:nvSpPr>
         <p:spPr>
           <a:xfrm>
-            <a:off x="4572000" y="664167"/>
-            <a:ext cx="914400" cy="369332"/>
+            <a:off x="1371600" y="1834634"/>
+            <a:ext cx="1188720" cy="369332"/>
           </a:xfrm>
           <a:prstGeom prst="rect">
             <a:avLst/>
@@ -4493,7 +4527,7 @@
           <a:p>
             <a:r>
               <a:rPr lang="en-US" dirty="0" smtClean="0"/>
-              <a:t>-0.830*</a:t>
+              <a:t>0.169***</a:t>
             </a:r>
             <a:endParaRPr lang="en-US" dirty="0"/>
           </a:p>
@@ -4501,14 +4535,14 @@
       </p:sp>
       <p:sp>
         <p:nvSpPr>
-          <p:cNvPr id="20" name="TextBox 19"/>
+          <p:cNvPr id="27" name="TextBox 26"/>
           <p:cNvSpPr txBox="1"/>
           <p:nvPr/>
         </p:nvSpPr>
         <p:spPr>
           <a:xfrm>
-            <a:off x="4610100" y="4760210"/>
-            <a:ext cx="914400" cy="369332"/>
+            <a:off x="7465881" y="1682234"/>
+            <a:ext cx="1188720" cy="369332"/>
           </a:xfrm>
           <a:prstGeom prst="rect">
             <a:avLst/>
@@ -4523,22 +4557,25 @@
           <a:p>
             <a:r>
               <a:rPr lang="en-US" dirty="0" smtClean="0"/>
-              <a:t>0.120*</a:t>
-            </a:r>
-            <a:endParaRPr lang="en-US" dirty="0"/>
-          </a:p>
-        </p:txBody>
-      </p:sp>
-      <p:sp>
-        <p:nvSpPr>
-          <p:cNvPr id="24" name="TextBox 23"/>
+              <a:t>-</a:t>
+            </a:r>
+            <a:r>
+              <a:rPr lang="en-US" dirty="0" smtClean="0"/>
+              <a:t>0.612***</a:t>
+            </a:r>
+          </a:p>
+        </p:txBody>
+      </p:sp>
+      <p:sp>
+        <p:nvSpPr>
+          <p:cNvPr id="28" name="TextBox 27"/>
           <p:cNvSpPr txBox="1"/>
           <p:nvPr/>
         </p:nvSpPr>
         <p:spPr>
           <a:xfrm>
-            <a:off x="3448493" y="1682234"/>
-            <a:ext cx="914400" cy="369332"/>
+            <a:off x="3124200" y="1333500"/>
+            <a:ext cx="1188720" cy="369332"/>
           </a:xfrm>
           <a:prstGeom prst="rect">
             <a:avLst/>
@@ -4553,7 +4590,7 @@
           <a:p>
             <a:r>
               <a:rPr lang="en-US" dirty="0" smtClean="0"/>
-              <a:t>2.806*</a:t>
+              <a:t>0.060**(?)</a:t>
             </a:r>
             <a:endParaRPr lang="en-US" dirty="0"/>
           </a:p>
@@ -4561,14 +4598,14 @@
       </p:sp>
       <p:sp>
         <p:nvSpPr>
-          <p:cNvPr id="28" name="TextBox 27"/>
+          <p:cNvPr id="29" name="TextBox 28"/>
           <p:cNvSpPr txBox="1"/>
           <p:nvPr/>
         </p:nvSpPr>
         <p:spPr>
           <a:xfrm>
-            <a:off x="3448493" y="3751153"/>
-            <a:ext cx="914400" cy="369332"/>
+            <a:off x="2514600" y="2497291"/>
+            <a:ext cx="1188720" cy="369332"/>
           </a:xfrm>
           <a:prstGeom prst="rect">
             <a:avLst/>
@@ -4583,7 +4620,7 @@
           <a:p>
             <a:r>
               <a:rPr lang="en-US" dirty="0" smtClean="0"/>
-              <a:t>4.311*</a:t>
+              <a:t>0.097***</a:t>
             </a:r>
             <a:endParaRPr lang="en-US" dirty="0"/>
           </a:p>
@@ -4598,7 +4635,7 @@
         <p:spPr>
           <a:xfrm>
             <a:off x="5075274" y="2136995"/>
-            <a:ext cx="914400" cy="369332"/>
+            <a:ext cx="1188720" cy="369332"/>
           </a:xfrm>
           <a:prstGeom prst="rect">
             <a:avLst/>
@@ -4613,7 +4650,7 @@
           <a:p>
             <a:r>
               <a:rPr lang="en-US" dirty="0" smtClean="0"/>
-              <a:t>0.505*</a:t>
+              <a:t>0.044*(?)</a:t>
             </a:r>
             <a:endParaRPr lang="en-US" dirty="0"/>
           </a:p>
@@ -4628,7 +4665,7 @@
         <p:spPr>
           <a:xfrm>
             <a:off x="5078818" y="3238500"/>
-            <a:ext cx="914400" cy="369332"/>
+            <a:ext cx="1188720" cy="369332"/>
           </a:xfrm>
           <a:prstGeom prst="rect">
             <a:avLst/>
@@ -4643,7 +4680,7 @@
           <a:p>
             <a:r>
               <a:rPr lang="en-US" dirty="0" smtClean="0"/>
-              <a:t>3.650*</a:t>
+              <a:t>0.042*(?)</a:t>
             </a:r>
             <a:endParaRPr lang="en-US" dirty="0"/>
           </a:p>
@@ -4658,7 +4695,7 @@
         <p:spPr>
           <a:xfrm>
             <a:off x="5715000" y="2552700"/>
-            <a:ext cx="914400" cy="369332"/>
+            <a:ext cx="1188720" cy="369332"/>
           </a:xfrm>
           <a:prstGeom prst="rect">
             <a:avLst/>
@@ -4673,7 +4710,11 @@
           <a:p>
             <a:r>
               <a:rPr lang="en-US" dirty="0" smtClean="0"/>
-              <a:t>-0.001*</a:t>
+              <a:t>-</a:t>
+            </a:r>
+            <a:r>
+              <a:rPr lang="en-US" dirty="0" smtClean="0"/>
+              <a:t>0.047*</a:t>
             </a:r>
             <a:endParaRPr lang="en-US" dirty="0"/>
           </a:p>
@@ -4688,7 +4729,7 @@
         <p:spPr>
           <a:xfrm>
             <a:off x="6172200" y="1943100"/>
-            <a:ext cx="914400" cy="369332"/>
+            <a:ext cx="1188720" cy="369332"/>
           </a:xfrm>
           <a:prstGeom prst="rect">
             <a:avLst/>
@@ -4703,7 +4744,7 @@
           <a:p>
             <a:r>
               <a:rPr lang="en-US" dirty="0" smtClean="0"/>
-              <a:t>0.062*</a:t>
+              <a:t>0.189***</a:t>
             </a:r>
             <a:endParaRPr lang="en-US" dirty="0"/>
           </a:p>
@@ -4718,7 +4759,7 @@
         <p:spPr>
           <a:xfrm>
             <a:off x="6172200" y="3445467"/>
-            <a:ext cx="914400" cy="369332"/>
+            <a:ext cx="1188720" cy="369332"/>
           </a:xfrm>
           <a:prstGeom prst="rect">
             <a:avLst/>
@@ -4733,9 +4774,41 @@
           <a:p>
             <a:r>
               <a:rPr lang="en-US" dirty="0" smtClean="0"/>
-              <a:t>-0.205*</a:t>
-            </a:r>
-            <a:endParaRPr lang="en-US" dirty="0"/>
+              <a:t>-</a:t>
+            </a:r>
+            <a:r>
+              <a:rPr lang="en-US" dirty="0" smtClean="0"/>
+              <a:t>0.082***</a:t>
+            </a:r>
+          </a:p>
+        </p:txBody>
+      </p:sp>
+      <p:sp>
+        <p:nvSpPr>
+          <p:cNvPr id="37" name="TextBox 36"/>
+          <p:cNvSpPr txBox="1"/>
+          <p:nvPr/>
+        </p:nvSpPr>
+        <p:spPr>
+          <a:xfrm>
+            <a:off x="7507180" y="3739634"/>
+            <a:ext cx="1188720" cy="369332"/>
+          </a:xfrm>
+          <a:prstGeom prst="rect">
+            <a:avLst/>
+          </a:prstGeom>
+          <a:noFill/>
+        </p:spPr>
+        <p:txBody>
+          <a:bodyPr wrap="square" rtlCol="0">
+            <a:spAutoFit/>
+          </a:bodyPr>
+          <a:lstStyle/>
+          <a:p>
+            <a:r>
+              <a:rPr lang="en-US" dirty="0" smtClean="0"/>
+              <a:t>0.094***</a:t>
+            </a:r>
           </a:p>
         </p:txBody>
       </p:sp>
@@ -4747,8 +4820,8 @@
         </p:nvSpPr>
         <p:spPr>
           <a:xfrm>
-            <a:off x="1142999" y="5230183"/>
-            <a:ext cx="3886201" cy="369332"/>
+            <a:off x="3140528" y="1593622"/>
+            <a:ext cx="914400" cy="261610"/>
           </a:xfrm>
           <a:prstGeom prst="rect">
             <a:avLst/>
@@ -4762,17 +4835,187 @@
           <a:lstStyle/>
           <a:p>
             <a:r>
+              <a:rPr lang="en-US" sz="1100" dirty="0"/>
+              <a:t>p</a:t>
+            </a:r>
+            <a:r>
+              <a:rPr lang="en-US" sz="1100" dirty="0" smtClean="0"/>
+              <a:t> = 0.011</a:t>
+            </a:r>
+          </a:p>
+        </p:txBody>
+      </p:sp>
+      <p:sp>
+        <p:nvSpPr>
+          <p:cNvPr id="38" name="TextBox 37"/>
+          <p:cNvSpPr txBox="1"/>
+          <p:nvPr/>
+        </p:nvSpPr>
+        <p:spPr>
+          <a:xfrm>
+            <a:off x="5105400" y="2367290"/>
+            <a:ext cx="914400" cy="261610"/>
+          </a:xfrm>
+          <a:prstGeom prst="rect">
+            <a:avLst/>
+          </a:prstGeom>
+          <a:noFill/>
+        </p:spPr>
+        <p:txBody>
+          <a:bodyPr wrap="square" rtlCol="0">
+            <a:spAutoFit/>
+          </a:bodyPr>
+          <a:lstStyle/>
+          <a:p>
+            <a:r>
+              <a:rPr lang="en-US" sz="1100" dirty="0"/>
+              <a:t>p</a:t>
+            </a:r>
+            <a:r>
+              <a:rPr lang="en-US" sz="1100" dirty="0" smtClean="0"/>
+              <a:t> = 0.055</a:t>
+            </a:r>
+          </a:p>
+        </p:txBody>
+      </p:sp>
+      <p:sp>
+        <p:nvSpPr>
+          <p:cNvPr id="39" name="TextBox 38"/>
+          <p:cNvSpPr txBox="1"/>
+          <p:nvPr/>
+        </p:nvSpPr>
+        <p:spPr>
+          <a:xfrm>
+            <a:off x="5105400" y="3467100"/>
+            <a:ext cx="914400" cy="261610"/>
+          </a:xfrm>
+          <a:prstGeom prst="rect">
+            <a:avLst/>
+          </a:prstGeom>
+          <a:noFill/>
+        </p:spPr>
+        <p:txBody>
+          <a:bodyPr wrap="square" rtlCol="0">
+            <a:spAutoFit/>
+          </a:bodyPr>
+          <a:lstStyle/>
+          <a:p>
+            <a:r>
+              <a:rPr lang="en-US" sz="1100" dirty="0"/>
+              <a:t>p</a:t>
+            </a:r>
+            <a:r>
+              <a:rPr lang="en-US" sz="1100" dirty="0" smtClean="0"/>
+              <a:t> = 0.063</a:t>
+            </a:r>
+          </a:p>
+        </p:txBody>
+      </p:sp>
+      <p:sp>
+        <p:nvSpPr>
+          <p:cNvPr id="40" name="TextBox 39"/>
+          <p:cNvSpPr txBox="1"/>
+          <p:nvPr/>
+        </p:nvSpPr>
+        <p:spPr>
+          <a:xfrm>
+            <a:off x="5791200" y="2857500"/>
+            <a:ext cx="914400" cy="261610"/>
+          </a:xfrm>
+          <a:prstGeom prst="rect">
+            <a:avLst/>
+          </a:prstGeom>
+          <a:noFill/>
+        </p:spPr>
+        <p:txBody>
+          <a:bodyPr wrap="square" rtlCol="0">
+            <a:spAutoFit/>
+          </a:bodyPr>
+          <a:lstStyle/>
+          <a:p>
+            <a:r>
+              <a:rPr lang="en-US" sz="1100" dirty="0"/>
+              <a:t>p</a:t>
+            </a:r>
+            <a:r>
+              <a:rPr lang="en-US" sz="1100" dirty="0" smtClean="0"/>
+              <a:t> = 0.05</a:t>
+            </a:r>
+          </a:p>
+        </p:txBody>
+      </p:sp>
+      <p:sp>
+        <p:nvSpPr>
+          <p:cNvPr id="10" name="TextBox 9"/>
+          <p:cNvSpPr txBox="1"/>
+          <p:nvPr/>
+        </p:nvSpPr>
+        <p:spPr>
+          <a:xfrm>
+            <a:off x="685800" y="4838700"/>
+            <a:ext cx="5562600" cy="369332"/>
+          </a:xfrm>
+          <a:prstGeom prst="rect">
+            <a:avLst/>
+          </a:prstGeom>
+          <a:noFill/>
+        </p:spPr>
+        <p:txBody>
+          <a:bodyPr wrap="square" rtlCol="0">
+            <a:spAutoFit/>
+          </a:bodyPr>
+          <a:lstStyle/>
+          <a:p>
+            <a:r>
               <a:rPr lang="en-US" dirty="0" smtClean="0"/>
-              <a:t>* p&lt;0.05, ** p&lt;0.01, *** p&lt;0.001</a:t>
+              <a:t>Pearson Correlation (</a:t>
+            </a:r>
+            <a:r>
+              <a:rPr lang="en-US" dirty="0" err="1" smtClean="0"/>
+              <a:t>CRECEIVEtr</a:t>
+            </a:r>
+            <a:r>
+              <a:rPr lang="en-US" dirty="0" smtClean="0"/>
+              <a:t>, ORIGINAL) = 0.110</a:t>
             </a:r>
             <a:endParaRPr lang="en-US" dirty="0"/>
+          </a:p>
+        </p:txBody>
+      </p:sp>
+      <p:sp>
+        <p:nvSpPr>
+          <p:cNvPr id="12" name="TextBox 11"/>
+          <p:cNvSpPr txBox="1"/>
+          <p:nvPr/>
+        </p:nvSpPr>
+        <p:spPr>
+          <a:xfrm>
+            <a:off x="914400" y="190500"/>
+            <a:ext cx="7315200" cy="369332"/>
+          </a:xfrm>
+          <a:prstGeom prst="rect">
+            <a:avLst/>
+          </a:prstGeom>
+          <a:noFill/>
+        </p:spPr>
+        <p:txBody>
+          <a:bodyPr wrap="square" rtlCol="0">
+            <a:spAutoFit/>
+          </a:bodyPr>
+          <a:lstStyle/>
+          <a:p>
+            <a:pPr algn="ctr"/>
+            <a:r>
+              <a:rPr lang="en-US" b="1" dirty="0" smtClean="0"/>
+              <a:t>Analysis of Path Model with Standardized Regression Coefficients</a:t>
+            </a:r>
           </a:p>
         </p:txBody>
       </p:sp>
     </p:spTree>
     <p:extLst>
       <p:ext uri="{BB962C8B-B14F-4D97-AF65-F5344CB8AC3E}">
-        <p14:creationId xmlns:p14="http://schemas.microsoft.com/office/powerpoint/2010/main" val="2495332603"/>
+        <p14:creationId xmlns:p14="http://schemas.microsoft.com/office/powerpoint/2010/main" val="1887972628"/>
       </p:ext>
     </p:extLst>
   </p:cSld>

</xml_diff>